<commit_message>
create markdown files for instructions and delete text files; update gitignore file
</commit_message>
<xml_diff>
--- a/session_1/slides/slides_intro.pptx
+++ b/session_1/slides/slides_intro.pptx
@@ -308,7 +308,7 @@
   <pc:docChgLst>
     <pc:chgData name="Lena Gschossmann" userId="bfd8fa5b3c2be1bd" providerId="LiveId" clId="{14CE2944-8739-4012-B97C-9A9A8C8E675E}"/>
     <pc:docChg chg="undo redo custSel addSld delSld modSld sldOrd">
-      <pc:chgData name="Lena Gschossmann" userId="bfd8fa5b3c2be1bd" providerId="LiveId" clId="{14CE2944-8739-4012-B97C-9A9A8C8E675E}" dt="2024-07-03T08:22:22.690" v="4075" actId="20577"/>
+      <pc:chgData name="Lena Gschossmann" userId="bfd8fa5b3c2be1bd" providerId="LiveId" clId="{14CE2944-8739-4012-B97C-9A9A8C8E675E}" dt="2024-07-04T16:00:49.063" v="4084" actId="20577"/>
       <pc:docMkLst>
         <pc:docMk/>
       </pc:docMkLst>
@@ -798,13 +798,13 @@
         </pc:picChg>
       </pc:sldChg>
       <pc:sldChg chg="delSp modSp add mod modNotesTx">
-        <pc:chgData name="Lena Gschossmann" userId="bfd8fa5b3c2be1bd" providerId="LiveId" clId="{14CE2944-8739-4012-B97C-9A9A8C8E675E}" dt="2024-07-01T08:41:52.597" v="3777" actId="20577"/>
+        <pc:chgData name="Lena Gschossmann" userId="bfd8fa5b3c2be1bd" providerId="LiveId" clId="{14CE2944-8739-4012-B97C-9A9A8C8E675E}" dt="2024-07-04T16:00:49.063" v="4084" actId="20577"/>
         <pc:sldMkLst>
           <pc:docMk/>
           <pc:sldMk cId="1828065030" sldId="266"/>
         </pc:sldMkLst>
         <pc:spChg chg="mod">
-          <ac:chgData name="Lena Gschossmann" userId="bfd8fa5b3c2be1bd" providerId="LiveId" clId="{14CE2944-8739-4012-B97C-9A9A8C8E675E}" dt="2024-07-01T08:41:52.597" v="3777" actId="20577"/>
+          <ac:chgData name="Lena Gschossmann" userId="bfd8fa5b3c2be1bd" providerId="LiveId" clId="{14CE2944-8739-4012-B97C-9A9A8C8E675E}" dt="2024-07-04T16:00:49.063" v="4084" actId="20577"/>
           <ac:spMkLst>
             <pc:docMk/>
             <pc:sldMk cId="1828065030" sldId="266"/>
@@ -986,7 +986,7 @@
           <a:p>
             <a:fld id="{08ED1807-82C1-4858-9D6C-BFB2DF91AC9F}" type="datetimeFigureOut">
               <a:rPr lang="LID4096" smtClean="0"/>
-              <a:t>07/03/2024</a:t>
+              <a:t>07/04/2024</a:t>
             </a:fld>
             <a:endParaRPr lang="LID4096"/>
           </a:p>
@@ -8510,7 +8510,7 @@
             </a:pPr>
             <a:r>
               <a:rPr lang="de-DE" sz="4000" b="0"/>
-              <a:t>Module 4	Use Visual Studio Code Git integration </a:t>
+              <a:t>Module 4	Basics of Visual Studio Code Git integration </a:t>
             </a:r>
             <a:r>
               <a:rPr lang="de-DE" sz="4000" b="0">

</xml_diff>

<commit_message>
update session_1 intro slides and remove module timing in README
</commit_message>
<xml_diff>
--- a/session_1/slides/slides_intro.pptx
+++ b/session_1/slides/slides_intro.pptx
@@ -308,7 +308,7 @@
   <pc:docChgLst>
     <pc:chgData name="Lena Gschossmann" userId="bfd8fa5b3c2be1bd" providerId="LiveId" clId="{14CE2944-8739-4012-B97C-9A9A8C8E675E}"/>
     <pc:docChg chg="undo redo custSel addSld delSld modSld sldOrd">
-      <pc:chgData name="Lena Gschossmann" userId="bfd8fa5b3c2be1bd" providerId="LiveId" clId="{14CE2944-8739-4012-B97C-9A9A8C8E675E}" dt="2024-07-04T16:00:49.063" v="4084" actId="20577"/>
+      <pc:chgData name="Lena Gschossmann" userId="bfd8fa5b3c2be1bd" providerId="LiveId" clId="{14CE2944-8739-4012-B97C-9A9A8C8E675E}" dt="2024-07-06T07:39:04.890" v="4091" actId="20577"/>
       <pc:docMkLst>
         <pc:docMk/>
       </pc:docMkLst>
@@ -798,13 +798,13 @@
         </pc:picChg>
       </pc:sldChg>
       <pc:sldChg chg="delSp modSp add mod modNotesTx">
-        <pc:chgData name="Lena Gschossmann" userId="bfd8fa5b3c2be1bd" providerId="LiveId" clId="{14CE2944-8739-4012-B97C-9A9A8C8E675E}" dt="2024-07-04T16:00:49.063" v="4084" actId="20577"/>
+        <pc:chgData name="Lena Gschossmann" userId="bfd8fa5b3c2be1bd" providerId="LiveId" clId="{14CE2944-8739-4012-B97C-9A9A8C8E675E}" dt="2024-07-06T07:39:04.890" v="4091" actId="20577"/>
         <pc:sldMkLst>
           <pc:docMk/>
           <pc:sldMk cId="1828065030" sldId="266"/>
         </pc:sldMkLst>
         <pc:spChg chg="mod">
-          <ac:chgData name="Lena Gschossmann" userId="bfd8fa5b3c2be1bd" providerId="LiveId" clId="{14CE2944-8739-4012-B97C-9A9A8C8E675E}" dt="2024-07-04T16:00:49.063" v="4084" actId="20577"/>
+          <ac:chgData name="Lena Gschossmann" userId="bfd8fa5b3c2be1bd" providerId="LiveId" clId="{14CE2944-8739-4012-B97C-9A9A8C8E675E}" dt="2024-07-06T07:39:04.890" v="4091" actId="20577"/>
           <ac:spMkLst>
             <pc:docMk/>
             <pc:sldMk cId="1828065030" sldId="266"/>
@@ -986,7 +986,7 @@
           <a:p>
             <a:fld id="{08ED1807-82C1-4858-9D6C-BFB2DF91AC9F}" type="datetimeFigureOut">
               <a:rPr lang="LID4096" smtClean="0"/>
-              <a:t>07/04/2024</a:t>
+              <a:t>07/06/2024</a:t>
             </a:fld>
             <a:endParaRPr lang="LID4096"/>
           </a:p>
@@ -8520,7 +8520,7 @@
                   </a:schemeClr>
                 </a:solidFill>
               </a:rPr>
-              <a:t>(15 min)</a:t>
+              <a:t>(5-10 min)</a:t>
             </a:r>
           </a:p>
           <a:p>
@@ -8548,7 +8548,7 @@
                   </a:schemeClr>
                 </a:solidFill>
               </a:rPr>
-              <a:t>(30 min)</a:t>
+              <a:t>(20-30 min)</a:t>
             </a:r>
           </a:p>
           <a:p>

</xml_diff>